<commit_message>
[Kerry] update day-2 code
</commit_message>
<xml_diff>
--- a/day-1/ddd-1.pptx
+++ b/day-1/ddd-1.pptx
@@ -310,7 +310,7 @@
           <a:p>
             <a:fld id="{03683205-7DCF-9447-B5AB-22DFE12CC2DE}" type="datetimeFigureOut">
               <a:rPr lang="en-US" smtClean="0"/>
-              <a:t>7/15/16</a:t>
+              <a:t>7/29/16</a:t>
             </a:fld>
             <a:endParaRPr lang="en-US"/>
           </a:p>
@@ -480,7 +480,7 @@
           <a:p>
             <a:fld id="{03683205-7DCF-9447-B5AB-22DFE12CC2DE}" type="datetimeFigureOut">
               <a:rPr lang="en-US" smtClean="0"/>
-              <a:t>7/15/16</a:t>
+              <a:t>7/29/16</a:t>
             </a:fld>
             <a:endParaRPr lang="en-US"/>
           </a:p>
@@ -660,7 +660,7 @@
           <a:p>
             <a:fld id="{03683205-7DCF-9447-B5AB-22DFE12CC2DE}" type="datetimeFigureOut">
               <a:rPr lang="en-US" smtClean="0"/>
-              <a:t>7/15/16</a:t>
+              <a:t>7/29/16</a:t>
             </a:fld>
             <a:endParaRPr lang="en-US"/>
           </a:p>
@@ -830,7 +830,7 @@
           <a:p>
             <a:fld id="{03683205-7DCF-9447-B5AB-22DFE12CC2DE}" type="datetimeFigureOut">
               <a:rPr lang="en-US" smtClean="0"/>
-              <a:t>7/15/16</a:t>
+              <a:t>7/29/16</a:t>
             </a:fld>
             <a:endParaRPr lang="en-US"/>
           </a:p>
@@ -1076,7 +1076,7 @@
           <a:p>
             <a:fld id="{03683205-7DCF-9447-B5AB-22DFE12CC2DE}" type="datetimeFigureOut">
               <a:rPr lang="en-US" smtClean="0"/>
-              <a:t>7/15/16</a:t>
+              <a:t>7/29/16</a:t>
             </a:fld>
             <a:endParaRPr lang="en-US"/>
           </a:p>
@@ -1364,7 +1364,7 @@
           <a:p>
             <a:fld id="{03683205-7DCF-9447-B5AB-22DFE12CC2DE}" type="datetimeFigureOut">
               <a:rPr lang="en-US" smtClean="0"/>
-              <a:t>7/15/16</a:t>
+              <a:t>7/29/16</a:t>
             </a:fld>
             <a:endParaRPr lang="en-US"/>
           </a:p>
@@ -1786,7 +1786,7 @@
           <a:p>
             <a:fld id="{03683205-7DCF-9447-B5AB-22DFE12CC2DE}" type="datetimeFigureOut">
               <a:rPr lang="en-US" smtClean="0"/>
-              <a:t>7/15/16</a:t>
+              <a:t>7/29/16</a:t>
             </a:fld>
             <a:endParaRPr lang="en-US"/>
           </a:p>
@@ -1904,7 +1904,7 @@
           <a:p>
             <a:fld id="{03683205-7DCF-9447-B5AB-22DFE12CC2DE}" type="datetimeFigureOut">
               <a:rPr lang="en-US" smtClean="0"/>
-              <a:t>7/15/16</a:t>
+              <a:t>7/29/16</a:t>
             </a:fld>
             <a:endParaRPr lang="en-US"/>
           </a:p>
@@ -1999,7 +1999,7 @@
           <a:p>
             <a:fld id="{03683205-7DCF-9447-B5AB-22DFE12CC2DE}" type="datetimeFigureOut">
               <a:rPr lang="en-US" smtClean="0"/>
-              <a:t>7/15/16</a:t>
+              <a:t>7/29/16</a:t>
             </a:fld>
             <a:endParaRPr lang="en-US"/>
           </a:p>
@@ -2276,7 +2276,7 @@
           <a:p>
             <a:fld id="{03683205-7DCF-9447-B5AB-22DFE12CC2DE}" type="datetimeFigureOut">
               <a:rPr lang="en-US" smtClean="0"/>
-              <a:t>7/15/16</a:t>
+              <a:t>7/29/16</a:t>
             </a:fld>
             <a:endParaRPr lang="en-US"/>
           </a:p>
@@ -2529,7 +2529,7 @@
           <a:p>
             <a:fld id="{03683205-7DCF-9447-B5AB-22DFE12CC2DE}" type="datetimeFigureOut">
               <a:rPr lang="en-US" smtClean="0"/>
-              <a:t>7/15/16</a:t>
+              <a:t>7/29/16</a:t>
             </a:fld>
             <a:endParaRPr lang="en-US"/>
           </a:p>
@@ -2742,7 +2742,7 @@
           <a:p>
             <a:fld id="{03683205-7DCF-9447-B5AB-22DFE12CC2DE}" type="datetimeFigureOut">
               <a:rPr lang="en-US" smtClean="0"/>
-              <a:t>7/15/16</a:t>
+              <a:t>7/29/16</a:t>
             </a:fld>
             <a:endParaRPr lang="en-US"/>
           </a:p>

</xml_diff>